<commit_message>
Alterei código e atualizei apresentação
</commit_message>
<xml_diff>
--- a/Trabalho final FCM 2024.pptx
+++ b/Trabalho final FCM 2024.pptx
@@ -3137,7 +3137,7 @@
                 <a:cs typeface="Forum"/>
                 <a:sym typeface="Forum"/>
               </a:rPr>
-              <a:t>TRABALHO FINAL | 2024</a:t>
+              <a:t>TRABALHO FINAL  |  2024</a:t>
             </a:r>
           </a:p>
         </p:txBody>
@@ -3277,7 +3277,7 @@
 </file>
 
 <file path=ppt/slides/slide10.xml><?xml version="1.0" encoding="utf-8"?>
-<p:sld xmlns:p="http://schemas.openxmlformats.org/presentationml/2006/main" xmlns:a="http://schemas.openxmlformats.org/drawingml/2006/main">
+<p:sld xmlns:p="http://schemas.openxmlformats.org/presentationml/2006/main" xmlns:a="http://schemas.openxmlformats.org/drawingml/2006/main" xmlns:r="http://schemas.openxmlformats.org/officeDocument/2006/relationships">
   <p:cSld>
     <p:spTree>
       <p:nvGrpSpPr>
@@ -3380,7 +3380,59 @@
       </p:grpSp>
       <p:sp>
         <p:nvSpPr>
-          <p:cNvPr name="TextBox 5" id="5"/>
+          <p:cNvPr name="Freeform 5" id="5"/>
+          <p:cNvSpPr/>
+          <p:nvPr/>
+        </p:nvSpPr>
+        <p:spPr>
+          <a:xfrm flipH="false" flipV="false" rot="0">
+            <a:off x="7171468" y="5800725"/>
+            <a:ext cx="3945064" cy="4114800"/>
+          </a:xfrm>
+          <a:custGeom>
+            <a:avLst/>
+            <a:gdLst/>
+            <a:ahLst/>
+            <a:cxnLst/>
+            <a:rect r="r" b="b" t="t" l="l"/>
+            <a:pathLst>
+              <a:path h="4114800" w="3945064">
+                <a:moveTo>
+                  <a:pt x="0" y="0"/>
+                </a:moveTo>
+                <a:lnTo>
+                  <a:pt x="3945064" y="0"/>
+                </a:lnTo>
+                <a:lnTo>
+                  <a:pt x="3945064" y="4114800"/>
+                </a:lnTo>
+                <a:lnTo>
+                  <a:pt x="0" y="4114800"/>
+                </a:lnTo>
+                <a:lnTo>
+                  <a:pt x="0" y="0"/>
+                </a:lnTo>
+                <a:close/>
+              </a:path>
+            </a:pathLst>
+          </a:custGeom>
+          <a:blipFill>
+            <a:blip r:embed="rId2">
+              <a:extLst>
+                <a:ext uri="{96DAC541-7B7A-43D3-8B79-37D633B846F1}">
+                  <asvg:svgBlip xmlns:asvg="http://schemas.microsoft.com/office/drawing/2016/SVG/main" r:embed="rId3"/>
+                </a:ext>
+              </a:extLst>
+            </a:blip>
+            <a:stretch>
+              <a:fillRect l="0" t="0" r="0" b="0"/>
+            </a:stretch>
+          </a:blipFill>
+        </p:spPr>
+      </p:sp>
+      <p:sp>
+        <p:nvSpPr>
+          <p:cNvPr name="TextBox 6" id="6"/>
           <p:cNvSpPr txBox="true"/>
           <p:nvPr/>
         </p:nvSpPr>
@@ -3424,14 +3476,14 @@
       </p:sp>
       <p:sp>
         <p:nvSpPr>
-          <p:cNvPr name="TextBox 6" id="6"/>
+          <p:cNvPr name="TextBox 7" id="7"/>
           <p:cNvSpPr txBox="true"/>
           <p:nvPr/>
         </p:nvSpPr>
         <p:spPr>
           <a:xfrm rot="0">
-            <a:off x="3518292" y="5778550"/>
-            <a:ext cx="11251416" cy="575240"/>
+            <a:off x="0" y="1619234"/>
+            <a:ext cx="18288000" cy="3524916"/>
           </a:xfrm>
           <a:prstGeom prst="rect">
             <a:avLst/>
@@ -3443,25 +3495,99 @@
           </a:bodyPr>
           <a:lstStyle/>
           <a:p>
-            <a:pPr algn="ctr">
+            <a:pPr algn="l" marL="723002" indent="-361501" lvl="1">
               <a:lnSpc>
                 <a:spcPts val="4688"/>
               </a:lnSpc>
-              <a:spcBef>
-                <a:spcPct val="0"/>
-              </a:spcBef>
+              <a:buFont typeface="Arial"/>
+              <a:buChar char="•"/>
             </a:pPr>
             <a:r>
               <a:rPr lang="en-US" sz="3348">
                 <a:solidFill>
-                  <a:srgbClr val="ABB194"/>
+                  <a:srgbClr val="000000"/>
                 </a:solidFill>
-                <a:latin typeface="Open Sauce"/>
-                <a:ea typeface="Open Sauce"/>
-                <a:cs typeface="Open Sauce"/>
-                <a:sym typeface="Open Sauce"/>
+                <a:latin typeface="Open Sauce Light"/>
+                <a:ea typeface="Open Sauce Light"/>
+                <a:cs typeface="Open Sauce Light"/>
+                <a:sym typeface="Open Sauce Light"/>
               </a:rPr>
-              <a:t>Conclusão e agradecer - quem quiser </a:t>
+              <a:t>Bons</a:t>
+            </a:r>
+            <a:r>
+              <a:rPr lang="en-US" sz="3348">
+                <a:solidFill>
+                  <a:srgbClr val="000000"/>
+                </a:solidFill>
+                <a:latin typeface="Open Sauce Light"/>
+                <a:ea typeface="Open Sauce Light"/>
+                <a:cs typeface="Open Sauce Light"/>
+                <a:sym typeface="Open Sauce Light"/>
+              </a:rPr>
+              <a:t> plots são essenciais para uma melhor apresentação dos resultados </a:t>
+            </a:r>
+          </a:p>
+          <a:p>
+            <a:pPr algn="l" marL="723002" indent="-361501" lvl="1">
+              <a:lnSpc>
+                <a:spcPts val="4688"/>
+              </a:lnSpc>
+              <a:buFont typeface="Arial"/>
+              <a:buChar char="•"/>
+            </a:pPr>
+            <a:r>
+              <a:rPr lang="en-US" sz="3348">
+                <a:solidFill>
+                  <a:srgbClr val="000000"/>
+                </a:solidFill>
+                <a:latin typeface="Open Sauce Light"/>
+                <a:ea typeface="Open Sauce Light"/>
+                <a:cs typeface="Open Sauce Light"/>
+                <a:sym typeface="Open Sauce Light"/>
+              </a:rPr>
+              <a:t>A utilização das cores opostas do círculo cromático também favorece uma melhor apresentação dos dados </a:t>
+            </a:r>
+          </a:p>
+          <a:p>
+            <a:pPr algn="l" marL="723002" indent="-361501" lvl="1">
+              <a:lnSpc>
+                <a:spcPts val="4688"/>
+              </a:lnSpc>
+              <a:buFont typeface="Arial"/>
+              <a:buChar char="•"/>
+            </a:pPr>
+            <a:r>
+              <a:rPr lang="en-US" sz="3348">
+                <a:solidFill>
+                  <a:srgbClr val="000000"/>
+                </a:solidFill>
+                <a:latin typeface="Open Sauce Light"/>
+                <a:ea typeface="Open Sauce Light"/>
+                <a:cs typeface="Open Sauce Light"/>
+                <a:sym typeface="Open Sauce Light"/>
+              </a:rPr>
+              <a:t>Git e GitHub foram ferramentas muito úteis para a realização do trabalho em grupo </a:t>
+            </a:r>
+          </a:p>
+          <a:p>
+            <a:pPr algn="l" marL="723002" indent="-361501" lvl="1">
+              <a:lnSpc>
+                <a:spcPts val="4688"/>
+              </a:lnSpc>
+              <a:buFont typeface="Arial"/>
+              <a:buChar char="•"/>
+            </a:pPr>
+            <a:r>
+              <a:rPr lang="en-US" sz="3348">
+                <a:solidFill>
+                  <a:srgbClr val="000000"/>
+                </a:solidFill>
+                <a:latin typeface="Open Sauce Light"/>
+                <a:ea typeface="Open Sauce Light"/>
+                <a:cs typeface="Open Sauce Light"/>
+                <a:sym typeface="Open Sauce Light"/>
+              </a:rPr>
+              <a:t>Novos conhecimentos sobre o R e seus pacotes foram essenciais para um bom desenvolvimento do trabalho como um todo</a:t>
             </a:r>
           </a:p>
         </p:txBody>
@@ -4109,7 +4235,7 @@
         <p:spPr>
           <a:xfrm rot="0">
             <a:off x="3857684" y="2449730"/>
-            <a:ext cx="11814338" cy="1753212"/>
+            <a:ext cx="11813571" cy="1752941"/>
           </a:xfrm>
           <a:prstGeom prst="rect">
             <a:avLst/>
@@ -4148,7 +4274,7 @@
                 <a:cs typeface="Open Sauce Light"/>
                 <a:sym typeface="Open Sauce Light"/>
               </a:rPr>
-              <a:t>valiações comportamentais da dor em suínos utilizando</a:t>
+              <a:t>valiações comportamentais da dor em suínos</a:t>
             </a:r>
           </a:p>
           <a:p>
@@ -5990,7 +6116,7 @@
         <p:spPr>
           <a:xfrm rot="0">
             <a:off x="2957542" y="6351238"/>
-            <a:ext cx="16230600" cy="2343744"/>
+            <a:ext cx="16230600" cy="2343816"/>
           </a:xfrm>
           <a:prstGeom prst="rect">
             <a:avLst/>
@@ -6043,7 +6169,7 @@
                 <a:cs typeface="Open Sauce Light"/>
                 <a:sym typeface="Open Sauce Light"/>
               </a:rPr>
-              <a:t>Análises estatísticas e representações gráficas. </a:t>
+              <a:t>Análise estatística e representações gráficas. </a:t>
             </a:r>
           </a:p>
         </p:txBody>
@@ -6314,7 +6440,7 @@
         </p:nvSpPr>
         <p:spPr>
           <a:xfrm flipH="false" flipV="false" rot="0">
-            <a:off x="2863255" y="1426731"/>
+            <a:off x="2863255" y="1456636"/>
             <a:ext cx="12561491" cy="8321988"/>
           </a:xfrm>
           <a:custGeom>
@@ -6360,8 +6486,8 @@
         </p:nvSpPr>
         <p:spPr>
           <a:xfrm rot="0">
-            <a:off x="0" y="-132431"/>
-            <a:ext cx="18288000" cy="1161131"/>
+            <a:off x="0" y="-132485"/>
+            <a:ext cx="18288000" cy="1161185"/>
           </a:xfrm>
           <a:prstGeom prst="rect">
             <a:avLst/>
@@ -6391,7 +6517,7 @@
                 <a:cs typeface="Forum"/>
                 <a:sym typeface="Forum"/>
               </a:rPr>
-              <a:t>METODOLOGIA E RESULTADOS</a:t>
+              <a:t>GRÁFICOS E RESULTADOS</a:t>
             </a:r>
           </a:p>
         </p:txBody>
@@ -6606,8 +6732,8 @@
         </p:nvSpPr>
         <p:spPr>
           <a:xfrm rot="0">
-            <a:off x="0" y="-132431"/>
-            <a:ext cx="18288000" cy="1161131"/>
+            <a:off x="0" y="-132485"/>
+            <a:ext cx="18288000" cy="1161185"/>
           </a:xfrm>
           <a:prstGeom prst="rect">
             <a:avLst/>
@@ -6637,7 +6763,7 @@
                 <a:cs typeface="Forum"/>
                 <a:sym typeface="Forum"/>
               </a:rPr>
-              <a:t>METODOLOGIA E RESULTADOS</a:t>
+              <a:t>GRÁFICOS E RESULTADOS</a:t>
             </a:r>
           </a:p>
         </p:txBody>
@@ -7300,8 +7426,8 @@
         </p:nvSpPr>
         <p:spPr>
           <a:xfrm rot="0">
-            <a:off x="0" y="-132431"/>
-            <a:ext cx="18288000" cy="1161131"/>
+            <a:off x="0" y="-132485"/>
+            <a:ext cx="18288000" cy="1161185"/>
           </a:xfrm>
           <a:prstGeom prst="rect">
             <a:avLst/>
@@ -7331,7 +7457,7 @@
                 <a:cs typeface="Forum"/>
                 <a:sym typeface="Forum"/>
               </a:rPr>
-              <a:t>METODOLOGIA E RESULTADOS</a:t>
+              <a:t>GRÁFICOS E RESULTADOS</a:t>
             </a:r>
           </a:p>
         </p:txBody>
@@ -7796,8 +7922,8 @@
         </p:nvSpPr>
         <p:spPr>
           <a:xfrm flipH="false" flipV="false" rot="0">
-            <a:off x="3304294" y="1581694"/>
-            <a:ext cx="11679412" cy="8058794"/>
+            <a:off x="2835808" y="1285550"/>
+            <a:ext cx="12616385" cy="8705306"/>
           </a:xfrm>
           <a:custGeom>
             <a:avLst/>
@@ -7806,18 +7932,18 @@
             <a:cxnLst/>
             <a:rect r="r" b="b" t="t" l="l"/>
             <a:pathLst>
-              <a:path h="8058794" w="11679412">
+              <a:path h="8705306" w="12616385">
                 <a:moveTo>
                   <a:pt x="0" y="0"/>
                 </a:moveTo>
                 <a:lnTo>
-                  <a:pt x="11679412" y="0"/>
-                </a:lnTo>
-                <a:lnTo>
-                  <a:pt x="11679412" y="8058794"/>
-                </a:lnTo>
-                <a:lnTo>
-                  <a:pt x="0" y="8058794"/>
+                  <a:pt x="12616384" y="0"/>
+                </a:lnTo>
+                <a:lnTo>
+                  <a:pt x="12616384" y="8705306"/>
+                </a:lnTo>
+                <a:lnTo>
+                  <a:pt x="0" y="8705306"/>
                 </a:lnTo>
                 <a:lnTo>
                   <a:pt x="0" y="0"/>
@@ -7842,8 +7968,8 @@
         </p:nvSpPr>
         <p:spPr>
           <a:xfrm rot="0">
-            <a:off x="0" y="-132431"/>
-            <a:ext cx="18288000" cy="1161131"/>
+            <a:off x="0" y="-132485"/>
+            <a:ext cx="18288000" cy="1161185"/>
           </a:xfrm>
           <a:prstGeom prst="rect">
             <a:avLst/>
@@ -7873,7 +7999,7 @@
                 <a:cs typeface="Forum"/>
                 <a:sym typeface="Forum"/>
               </a:rPr>
-              <a:t>METODOLOGIA E RESULTADOS</a:t>
+              <a:t>GRÁFICOS E RESULTADOS</a:t>
             </a:r>
           </a:p>
         </p:txBody>

</xml_diff>